<commit_message>
Added new slides for optimization of structures
</commit_message>
<xml_diff>
--- a/optimization-methods-for-artificial-intelligence/optimization-advanced.pptx
+++ b/optimization-methods-for-artificial-intelligence/optimization-advanced.pptx
@@ -23,7 +23,9 @@
     <p:sldId id="274" r:id="rId17"/>
     <p:sldId id="265" r:id="rId18"/>
     <p:sldId id="275" r:id="rId19"/>
-    <p:sldId id="269" r:id="rId20"/>
+    <p:sldId id="279" r:id="rId20"/>
+    <p:sldId id="280" r:id="rId21"/>
+    <p:sldId id="269" r:id="rId22"/>
   </p:sldIdLst>
   <p:sldSz cx="12192000" cy="6858000"/>
   <p:notesSz cx="6858000" cy="9144000"/>
@@ -2426,10 +2428,10 @@
       </mc:AlternateContent>
       <p:pic>
         <p:nvPicPr>
-          <p:cNvPr id="4" name="Picture 2" descr="Dirac delta function - Wikipedia">
-            <a:extLst>
-              <a:ext uri="{FF2B5EF4-FFF2-40B4-BE49-F238E27FC236}">
-                <a16:creationId xmlns:a16="http://schemas.microsoft.com/office/drawing/2014/main" id="{98F51FD6-51B0-409A-BC77-DCEDA80C030B}"/>
+          <p:cNvPr id="8" name="Picture 2" descr="Dirac delta function - Wikipedia">
+            <a:extLst>
+              <a:ext uri="{FF2B5EF4-FFF2-40B4-BE49-F238E27FC236}">
+                <a16:creationId xmlns:a16="http://schemas.microsoft.com/office/drawing/2014/main" id="{270CF6F3-E0BE-48EB-82CE-14AC6314F72D}"/>
               </a:ext>
             </a:extLst>
           </p:cNvPr>
@@ -2453,7 +2455,7 @@
         </p:blipFill>
         <p:spPr bwMode="auto">
           <a:xfrm>
-            <a:off x="7311026" y="3316137"/>
+            <a:off x="7311600" y="3316137"/>
             <a:ext cx="4231310" cy="3176737"/>
           </a:xfrm>
           <a:prstGeom prst="rect">
@@ -3121,6 +3123,326 @@
       </p:grpSpPr>
       <p:sp>
         <p:nvSpPr>
+          <p:cNvPr id="20" name="Flèche : virage 19">
+            <a:extLst>
+              <a:ext uri="{FF2B5EF4-FFF2-40B4-BE49-F238E27FC236}">
+                <a16:creationId xmlns:a16="http://schemas.microsoft.com/office/drawing/2014/main" id="{EB17A48B-008F-4971-88DE-9197043F123C}"/>
+              </a:ext>
+            </a:extLst>
+          </p:cNvPr>
+          <p:cNvSpPr/>
+          <p:nvPr/>
+        </p:nvSpPr>
+        <p:spPr>
+          <a:xfrm rot="16200000">
+            <a:off x="4099390" y="2038850"/>
+            <a:ext cx="887774" cy="4940530"/>
+          </a:xfrm>
+          <a:prstGeom prst="bentArrow">
+            <a:avLst>
+              <a:gd name="adj1" fmla="val 25000"/>
+              <a:gd name="adj2" fmla="val 25000"/>
+              <a:gd name="adj3" fmla="val 28186"/>
+              <a:gd name="adj4" fmla="val 43750"/>
+            </a:avLst>
+          </a:prstGeom>
+        </p:spPr>
+        <p:style>
+          <a:lnRef idx="2">
+            <a:schemeClr val="dk1"/>
+          </a:lnRef>
+          <a:fillRef idx="1">
+            <a:schemeClr val="lt1"/>
+          </a:fillRef>
+          <a:effectRef idx="0">
+            <a:schemeClr val="dk1"/>
+          </a:effectRef>
+          <a:fontRef idx="minor">
+            <a:schemeClr val="dk1"/>
+          </a:fontRef>
+        </p:style>
+        <p:txBody>
+          <a:bodyPr rtlCol="0" anchor="ctr"/>
+          <a:lstStyle/>
+          <a:p>
+            <a:pPr algn="ctr"/>
+            <a:endParaRPr lang="en-US">
+              <a:solidFill>
+                <a:schemeClr val="tx1"/>
+              </a:solidFill>
+            </a:endParaRPr>
+          </a:p>
+        </p:txBody>
+      </p:sp>
+      <p:sp>
+        <p:nvSpPr>
+          <p:cNvPr id="21" name="Flèche : droite 20">
+            <a:extLst>
+              <a:ext uri="{FF2B5EF4-FFF2-40B4-BE49-F238E27FC236}">
+                <a16:creationId xmlns:a16="http://schemas.microsoft.com/office/drawing/2014/main" id="{A2841F2E-50A5-4CAC-A645-961AF2B1A3E2}"/>
+              </a:ext>
+            </a:extLst>
+          </p:cNvPr>
+          <p:cNvSpPr/>
+          <p:nvPr/>
+        </p:nvSpPr>
+        <p:spPr>
+          <a:xfrm rot="16200000">
+            <a:off x="1733645" y="3233927"/>
+            <a:ext cx="1065229" cy="386499"/>
+          </a:xfrm>
+          <a:prstGeom prst="rightArrow">
+            <a:avLst/>
+          </a:prstGeom>
+        </p:spPr>
+        <p:style>
+          <a:lnRef idx="2">
+            <a:schemeClr val="dk1"/>
+          </a:lnRef>
+          <a:fillRef idx="1">
+            <a:schemeClr val="lt1"/>
+          </a:fillRef>
+          <a:effectRef idx="0">
+            <a:schemeClr val="dk1"/>
+          </a:effectRef>
+          <a:fontRef idx="minor">
+            <a:schemeClr val="dk1"/>
+          </a:fontRef>
+        </p:style>
+        <p:txBody>
+          <a:bodyPr rtlCol="0" anchor="ctr"/>
+          <a:lstStyle/>
+          <a:p>
+            <a:pPr algn="ctr"/>
+            <a:endParaRPr lang="en-US"/>
+          </a:p>
+        </p:txBody>
+      </p:sp>
+      <p:sp>
+        <p:nvSpPr>
+          <p:cNvPr id="18" name="Flèche : droite 17">
+            <a:extLst>
+              <a:ext uri="{FF2B5EF4-FFF2-40B4-BE49-F238E27FC236}">
+                <a16:creationId xmlns:a16="http://schemas.microsoft.com/office/drawing/2014/main" id="{8A3DEDA3-09DA-4A9A-A6FA-D477B1B50E26}"/>
+              </a:ext>
+            </a:extLst>
+          </p:cNvPr>
+          <p:cNvSpPr/>
+          <p:nvPr/>
+        </p:nvSpPr>
+        <p:spPr>
+          <a:xfrm rot="10800000">
+            <a:off x="3089535" y="3471339"/>
+            <a:ext cx="2293953" cy="386499"/>
+          </a:xfrm>
+          <a:prstGeom prst="rightArrow">
+            <a:avLst/>
+          </a:prstGeom>
+        </p:spPr>
+        <p:style>
+          <a:lnRef idx="2">
+            <a:schemeClr val="dk1"/>
+          </a:lnRef>
+          <a:fillRef idx="1">
+            <a:schemeClr val="lt1"/>
+          </a:fillRef>
+          <a:effectRef idx="0">
+            <a:schemeClr val="dk1"/>
+          </a:effectRef>
+          <a:fontRef idx="minor">
+            <a:schemeClr val="dk1"/>
+          </a:fontRef>
+        </p:style>
+        <p:txBody>
+          <a:bodyPr rtlCol="0" anchor="ctr"/>
+          <a:lstStyle/>
+          <a:p>
+            <a:pPr algn="ctr"/>
+            <a:endParaRPr lang="en-US"/>
+          </a:p>
+        </p:txBody>
+      </p:sp>
+      <p:sp>
+        <p:nvSpPr>
+          <p:cNvPr id="13" name="Flèche : droite 12">
+            <a:extLst>
+              <a:ext uri="{FF2B5EF4-FFF2-40B4-BE49-F238E27FC236}">
+                <a16:creationId xmlns:a16="http://schemas.microsoft.com/office/drawing/2014/main" id="{2D0EED0F-580E-45BA-A66F-0BDBB43ACE33}"/>
+              </a:ext>
+            </a:extLst>
+          </p:cNvPr>
+          <p:cNvSpPr/>
+          <p:nvPr/>
+        </p:nvSpPr>
+        <p:spPr>
+          <a:xfrm rot="10800000">
+            <a:off x="6349735" y="3471341"/>
+            <a:ext cx="1065229" cy="386499"/>
+          </a:xfrm>
+          <a:prstGeom prst="rightArrow">
+            <a:avLst/>
+          </a:prstGeom>
+        </p:spPr>
+        <p:style>
+          <a:lnRef idx="2">
+            <a:schemeClr val="dk1"/>
+          </a:lnRef>
+          <a:fillRef idx="1">
+            <a:schemeClr val="lt1"/>
+          </a:fillRef>
+          <a:effectRef idx="0">
+            <a:schemeClr val="dk1"/>
+          </a:effectRef>
+          <a:fontRef idx="minor">
+            <a:schemeClr val="dk1"/>
+          </a:fontRef>
+        </p:style>
+        <p:txBody>
+          <a:bodyPr rtlCol="0" anchor="ctr"/>
+          <a:lstStyle/>
+          <a:p>
+            <a:pPr algn="ctr"/>
+            <a:endParaRPr lang="en-US"/>
+          </a:p>
+        </p:txBody>
+      </p:sp>
+      <p:sp>
+        <p:nvSpPr>
+          <p:cNvPr id="12" name="Flèche : droite 11">
+            <a:extLst>
+              <a:ext uri="{FF2B5EF4-FFF2-40B4-BE49-F238E27FC236}">
+                <a16:creationId xmlns:a16="http://schemas.microsoft.com/office/drawing/2014/main" id="{46CD3DCB-5794-4F23-B960-FC7864A82892}"/>
+              </a:ext>
+            </a:extLst>
+          </p:cNvPr>
+          <p:cNvSpPr/>
+          <p:nvPr/>
+        </p:nvSpPr>
+        <p:spPr>
+          <a:xfrm rot="10800000">
+            <a:off x="8711934" y="3456061"/>
+            <a:ext cx="1065229" cy="386499"/>
+          </a:xfrm>
+          <a:prstGeom prst="rightArrow">
+            <a:avLst/>
+          </a:prstGeom>
+        </p:spPr>
+        <p:style>
+          <a:lnRef idx="2">
+            <a:schemeClr val="dk1"/>
+          </a:lnRef>
+          <a:fillRef idx="1">
+            <a:schemeClr val="lt1"/>
+          </a:fillRef>
+          <a:effectRef idx="0">
+            <a:schemeClr val="dk1"/>
+          </a:effectRef>
+          <a:fontRef idx="minor">
+            <a:schemeClr val="dk1"/>
+          </a:fontRef>
+        </p:style>
+        <p:txBody>
+          <a:bodyPr rtlCol="0" anchor="ctr"/>
+          <a:lstStyle/>
+          <a:p>
+            <a:pPr algn="ctr"/>
+            <a:endParaRPr lang="en-US"/>
+          </a:p>
+        </p:txBody>
+      </p:sp>
+      <p:pic>
+        <p:nvPicPr>
+          <p:cNvPr id="2050" name="Picture 2" descr="Nokia feature phones catalogue | Compare basic mobiles by prices">
+            <a:extLst>
+              <a:ext uri="{FF2B5EF4-FFF2-40B4-BE49-F238E27FC236}">
+                <a16:creationId xmlns:a16="http://schemas.microsoft.com/office/drawing/2014/main" id="{C4D6555D-FAB1-4617-B5BD-F93AD2E8DB52}"/>
+              </a:ext>
+            </a:extLst>
+          </p:cNvPr>
+          <p:cNvPicPr>
+            <a:picLocks noChangeAspect="1" noChangeArrowheads="1"/>
+          </p:cNvPicPr>
+          <p:nvPr/>
+        </p:nvPicPr>
+        <p:blipFill>
+          <a:blip r:embed="rId2" cstate="print">
+            <a:extLst>
+              <a:ext uri="{28A0092B-C50C-407E-A947-70E740481C1C}">
+                <a14:useLocalDpi xmlns:a14="http://schemas.microsoft.com/office/drawing/2010/main" val="0"/>
+              </a:ext>
+            </a:extLst>
+          </a:blip>
+          <a:srcRect/>
+          <a:stretch>
+            <a:fillRect/>
+          </a:stretch>
+        </p:blipFill>
+        <p:spPr bwMode="auto">
+          <a:xfrm>
+            <a:off x="9491418" y="1806937"/>
+            <a:ext cx="1855697" cy="4232635"/>
+          </a:xfrm>
+          <a:prstGeom prst="rect">
+            <a:avLst/>
+          </a:prstGeom>
+          <a:noFill/>
+          <a:extLst>
+            <a:ext uri="{909E8E84-426E-40DD-AFC4-6F175D3DCCD1}">
+              <a14:hiddenFill xmlns:a14="http://schemas.microsoft.com/office/drawing/2010/main">
+                <a:solidFill>
+                  <a:srgbClr val="FFFFFF"/>
+                </a:solidFill>
+              </a14:hiddenFill>
+            </a:ext>
+          </a:extLst>
+        </p:spPr>
+      </p:pic>
+      <p:sp>
+        <p:nvSpPr>
+          <p:cNvPr id="9" name="Flèche : droite 8">
+            <a:extLst>
+              <a:ext uri="{FF2B5EF4-FFF2-40B4-BE49-F238E27FC236}">
+                <a16:creationId xmlns:a16="http://schemas.microsoft.com/office/drawing/2014/main" id="{0F3E9B66-6FAC-4D11-9666-A15750265A14}"/>
+              </a:ext>
+            </a:extLst>
+          </p:cNvPr>
+          <p:cNvSpPr/>
+          <p:nvPr/>
+        </p:nvSpPr>
+        <p:spPr>
+          <a:xfrm>
+            <a:off x="5410984" y="2302642"/>
+            <a:ext cx="4213783" cy="386499"/>
+          </a:xfrm>
+          <a:prstGeom prst="rightArrow">
+            <a:avLst/>
+          </a:prstGeom>
+        </p:spPr>
+        <p:style>
+          <a:lnRef idx="2">
+            <a:schemeClr val="dk1"/>
+          </a:lnRef>
+          <a:fillRef idx="1">
+            <a:schemeClr val="lt1"/>
+          </a:fillRef>
+          <a:effectRef idx="0">
+            <a:schemeClr val="dk1"/>
+          </a:effectRef>
+          <a:fontRef idx="minor">
+            <a:schemeClr val="dk1"/>
+          </a:fontRef>
+        </p:style>
+        <p:txBody>
+          <a:bodyPr rtlCol="0" anchor="ctr"/>
+          <a:lstStyle/>
+          <a:p>
+            <a:pPr algn="ctr"/>
+            <a:endParaRPr lang="en-US"/>
+          </a:p>
+        </p:txBody>
+      </p:sp>
+      <p:sp>
+        <p:nvSpPr>
           <p:cNvPr id="2" name="Titre 1">
             <a:extLst>
               <a:ext uri="{FF2B5EF4-FFF2-40B4-BE49-F238E27FC236}">
@@ -3163,12 +3485,526 @@
             <p:ph type="body" sz="quarter" idx="10"/>
           </p:nvPr>
         </p:nvSpPr>
-        <p:spPr/>
-        <p:txBody>
-          <a:bodyPr/>
+        <p:spPr>
+          <a:xfrm>
+            <a:off x="838200" y="1423359"/>
+            <a:ext cx="10515600" cy="245186"/>
+          </a:xfrm>
+        </p:spPr>
+        <p:txBody>
+          <a:bodyPr>
+            <a:normAutofit fontScale="40000" lnSpcReduction="20000"/>
+          </a:bodyPr>
           <a:lstStyle/>
           <a:p>
+            <a:endParaRPr lang="en-US" dirty="0"/>
+          </a:p>
+        </p:txBody>
+      </p:sp>
+      <p:sp>
+        <p:nvSpPr>
+          <p:cNvPr id="5" name="Flèche : droite 4">
+            <a:extLst>
+              <a:ext uri="{FF2B5EF4-FFF2-40B4-BE49-F238E27FC236}">
+                <a16:creationId xmlns:a16="http://schemas.microsoft.com/office/drawing/2014/main" id="{CBF4FF94-CDC0-41B2-A899-A880F6956D76}"/>
+              </a:ext>
+            </a:extLst>
+          </p:cNvPr>
+          <p:cNvSpPr/>
+          <p:nvPr/>
+        </p:nvSpPr>
+        <p:spPr>
+          <a:xfrm>
+            <a:off x="2869083" y="2302642"/>
+            <a:ext cx="1065229" cy="386499"/>
+          </a:xfrm>
+          <a:prstGeom prst="rightArrow">
+            <a:avLst/>
+          </a:prstGeom>
+        </p:spPr>
+        <p:style>
+          <a:lnRef idx="2">
+            <a:schemeClr val="dk1"/>
+          </a:lnRef>
+          <a:fillRef idx="1">
+            <a:schemeClr val="lt1"/>
+          </a:fillRef>
+          <a:effectRef idx="0">
+            <a:schemeClr val="dk1"/>
+          </a:effectRef>
+          <a:fontRef idx="minor">
+            <a:schemeClr val="dk1"/>
+          </a:fontRef>
+        </p:style>
+        <p:txBody>
+          <a:bodyPr rtlCol="0" anchor="ctr"/>
+          <a:lstStyle/>
+          <a:p>
+            <a:pPr algn="ctr"/>
             <a:endParaRPr lang="en-US"/>
+          </a:p>
+        </p:txBody>
+      </p:sp>
+      <p:sp>
+        <p:nvSpPr>
+          <p:cNvPr id="6" name="Rectangle : coins arrondis 5">
+            <a:extLst>
+              <a:ext uri="{FF2B5EF4-FFF2-40B4-BE49-F238E27FC236}">
+                <a16:creationId xmlns:a16="http://schemas.microsoft.com/office/drawing/2014/main" id="{9F7B7214-FBD9-44BC-8C07-0723D41EBCDB}"/>
+              </a:ext>
+            </a:extLst>
+          </p:cNvPr>
+          <p:cNvSpPr/>
+          <p:nvPr/>
+        </p:nvSpPr>
+        <p:spPr>
+          <a:xfrm>
+            <a:off x="1357461" y="2096146"/>
+            <a:ext cx="1715678" cy="801278"/>
+          </a:xfrm>
+          <a:prstGeom prst="roundRect">
+            <a:avLst/>
+          </a:prstGeom>
+        </p:spPr>
+        <p:style>
+          <a:lnRef idx="2">
+            <a:schemeClr val="accent6"/>
+          </a:lnRef>
+          <a:fillRef idx="1">
+            <a:schemeClr val="lt1"/>
+          </a:fillRef>
+          <a:effectRef idx="0">
+            <a:schemeClr val="accent6"/>
+          </a:effectRef>
+          <a:fontRef idx="minor">
+            <a:schemeClr val="dk1"/>
+          </a:fontRef>
+        </p:style>
+        <p:txBody>
+          <a:bodyPr rtlCol="0" anchor="ctr"/>
+          <a:lstStyle/>
+          <a:p>
+            <a:pPr algn="ctr"/>
+            <a:r>
+              <a:rPr lang="en-US" dirty="0"/>
+              <a:t>Evolutionary Algorithm</a:t>
+            </a:r>
+          </a:p>
+        </p:txBody>
+      </p:sp>
+      <p:sp>
+        <p:nvSpPr>
+          <p:cNvPr id="7" name="Rectangle 6">
+            <a:extLst>
+              <a:ext uri="{FF2B5EF4-FFF2-40B4-BE49-F238E27FC236}">
+                <a16:creationId xmlns:a16="http://schemas.microsoft.com/office/drawing/2014/main" id="{DD4C7CE6-2899-4FDB-8ED6-70113B6A85AF}"/>
+              </a:ext>
+            </a:extLst>
+          </p:cNvPr>
+          <p:cNvSpPr/>
+          <p:nvPr/>
+        </p:nvSpPr>
+        <p:spPr>
+          <a:xfrm>
+            <a:off x="3940404" y="2170711"/>
+            <a:ext cx="1545995" cy="652147"/>
+          </a:xfrm>
+          <a:prstGeom prst="rect">
+            <a:avLst/>
+          </a:prstGeom>
+        </p:spPr>
+        <p:style>
+          <a:lnRef idx="2">
+            <a:schemeClr val="dk1"/>
+          </a:lnRef>
+          <a:fillRef idx="1">
+            <a:schemeClr val="lt1"/>
+          </a:fillRef>
+          <a:effectRef idx="0">
+            <a:schemeClr val="dk1"/>
+          </a:effectRef>
+          <a:fontRef idx="minor">
+            <a:schemeClr val="dk1"/>
+          </a:fontRef>
+        </p:style>
+        <p:txBody>
+          <a:bodyPr rtlCol="0" anchor="ctr"/>
+          <a:lstStyle/>
+          <a:p>
+            <a:pPr algn="ctr"/>
+            <a:r>
+              <a:rPr lang="en-US" dirty="0"/>
+              <a:t>Sequence of inputs</a:t>
+            </a:r>
+          </a:p>
+        </p:txBody>
+      </p:sp>
+      <p:sp>
+        <p:nvSpPr>
+          <p:cNvPr id="16" name="Flèche : droite 15">
+            <a:extLst>
+              <a:ext uri="{FF2B5EF4-FFF2-40B4-BE49-F238E27FC236}">
+                <a16:creationId xmlns:a16="http://schemas.microsoft.com/office/drawing/2014/main" id="{00BF3866-29A0-4B4E-B41C-7B1E2B6A6720}"/>
+              </a:ext>
+            </a:extLst>
+          </p:cNvPr>
+          <p:cNvSpPr/>
+          <p:nvPr/>
+        </p:nvSpPr>
+        <p:spPr>
+          <a:xfrm rot="5400000">
+            <a:off x="7406322" y="3768365"/>
+            <a:ext cx="1065229" cy="386499"/>
+          </a:xfrm>
+          <a:prstGeom prst="rightArrow">
+            <a:avLst/>
+          </a:prstGeom>
+        </p:spPr>
+        <p:style>
+          <a:lnRef idx="2">
+            <a:schemeClr val="dk1"/>
+          </a:lnRef>
+          <a:fillRef idx="1">
+            <a:schemeClr val="lt1"/>
+          </a:fillRef>
+          <a:effectRef idx="0">
+            <a:schemeClr val="dk1"/>
+          </a:effectRef>
+          <a:fontRef idx="minor">
+            <a:schemeClr val="dk1"/>
+          </a:fontRef>
+        </p:style>
+        <p:txBody>
+          <a:bodyPr rtlCol="0" anchor="ctr"/>
+          <a:lstStyle/>
+          <a:p>
+            <a:pPr algn="ctr"/>
+            <a:endParaRPr lang="en-US"/>
+          </a:p>
+        </p:txBody>
+      </p:sp>
+      <p:sp>
+        <p:nvSpPr>
+          <p:cNvPr id="8" name="ZoneTexte 7">
+            <a:extLst>
+              <a:ext uri="{FF2B5EF4-FFF2-40B4-BE49-F238E27FC236}">
+                <a16:creationId xmlns:a16="http://schemas.microsoft.com/office/drawing/2014/main" id="{CC880039-5A34-475B-9126-141F31C69996}"/>
+              </a:ext>
+            </a:extLst>
+          </p:cNvPr>
+          <p:cNvSpPr txBox="1"/>
+          <p:nvPr/>
+        </p:nvSpPr>
+        <p:spPr>
+          <a:xfrm>
+            <a:off x="3701791" y="1806937"/>
+            <a:ext cx="2130458" cy="369332"/>
+          </a:xfrm>
+          <a:prstGeom prst="rect">
+            <a:avLst/>
+          </a:prstGeom>
+          <a:noFill/>
+        </p:spPr>
+        <p:txBody>
+          <a:bodyPr wrap="square" rtlCol="0">
+            <a:spAutoFit/>
+          </a:bodyPr>
+          <a:lstStyle/>
+          <a:p>
+            <a:r>
+              <a:rPr lang="en-US" b="1" dirty="0">
+                <a:solidFill>
+                  <a:schemeClr val="accent6"/>
+                </a:solidFill>
+              </a:rPr>
+              <a:t>Candidate solution</a:t>
+            </a:r>
+          </a:p>
+        </p:txBody>
+      </p:sp>
+      <p:sp>
+        <p:nvSpPr>
+          <p:cNvPr id="11" name="Rectangle 10">
+            <a:extLst>
+              <a:ext uri="{FF2B5EF4-FFF2-40B4-BE49-F238E27FC236}">
+                <a16:creationId xmlns:a16="http://schemas.microsoft.com/office/drawing/2014/main" id="{35D270AB-7D56-491B-8CF4-0F3C2C0B9ED4}"/>
+              </a:ext>
+            </a:extLst>
+          </p:cNvPr>
+          <p:cNvSpPr/>
+          <p:nvPr/>
+        </p:nvSpPr>
+        <p:spPr>
+          <a:xfrm>
+            <a:off x="7165939" y="3323238"/>
+            <a:ext cx="1545995" cy="652147"/>
+          </a:xfrm>
+          <a:prstGeom prst="rect">
+            <a:avLst/>
+          </a:prstGeom>
+        </p:spPr>
+        <p:style>
+          <a:lnRef idx="2">
+            <a:schemeClr val="dk1"/>
+          </a:lnRef>
+          <a:fillRef idx="1">
+            <a:schemeClr val="lt1"/>
+          </a:fillRef>
+          <a:effectRef idx="0">
+            <a:schemeClr val="dk1"/>
+          </a:effectRef>
+          <a:fontRef idx="minor">
+            <a:schemeClr val="dk1"/>
+          </a:fontRef>
+        </p:style>
+        <p:txBody>
+          <a:bodyPr rtlCol="0" anchor="ctr"/>
+          <a:lstStyle/>
+          <a:p>
+            <a:pPr algn="ctr"/>
+            <a:r>
+              <a:rPr lang="en-US" dirty="0"/>
+              <a:t>Phone logs</a:t>
+            </a:r>
+          </a:p>
+        </p:txBody>
+      </p:sp>
+      <p:sp>
+        <p:nvSpPr>
+          <p:cNvPr id="10" name="Rectangle : coins arrondis 9">
+            <a:extLst>
+              <a:ext uri="{FF2B5EF4-FFF2-40B4-BE49-F238E27FC236}">
+                <a16:creationId xmlns:a16="http://schemas.microsoft.com/office/drawing/2014/main" id="{0D38A7B4-0BFF-426F-BFF0-0FE61BCBE320}"/>
+              </a:ext>
+            </a:extLst>
+          </p:cNvPr>
+          <p:cNvSpPr/>
+          <p:nvPr/>
+        </p:nvSpPr>
+        <p:spPr>
+          <a:xfrm>
+            <a:off x="5199664" y="3318563"/>
+            <a:ext cx="1150070" cy="652147"/>
+          </a:xfrm>
+          <a:prstGeom prst="roundRect">
+            <a:avLst/>
+          </a:prstGeom>
+        </p:spPr>
+        <p:style>
+          <a:lnRef idx="2">
+            <a:schemeClr val="accent1">
+              <a:shade val="50000"/>
+            </a:schemeClr>
+          </a:lnRef>
+          <a:fillRef idx="1">
+            <a:schemeClr val="accent1"/>
+          </a:fillRef>
+          <a:effectRef idx="0">
+            <a:schemeClr val="accent1"/>
+          </a:effectRef>
+          <a:fontRef idx="minor">
+            <a:schemeClr val="lt1"/>
+          </a:fontRef>
+        </p:style>
+        <p:txBody>
+          <a:bodyPr rtlCol="0" anchor="ctr"/>
+          <a:lstStyle/>
+          <a:p>
+            <a:pPr algn="ctr"/>
+            <a:r>
+              <a:rPr lang="en-US" dirty="0"/>
+              <a:t>Bug?</a:t>
+            </a:r>
+          </a:p>
+        </p:txBody>
+      </p:sp>
+      <p:sp>
+        <p:nvSpPr>
+          <p:cNvPr id="17" name="Rectangle : coins arrondis 16">
+            <a:extLst>
+              <a:ext uri="{FF2B5EF4-FFF2-40B4-BE49-F238E27FC236}">
+                <a16:creationId xmlns:a16="http://schemas.microsoft.com/office/drawing/2014/main" id="{F2623828-7B28-4A81-B33C-12BA6BA4BE84}"/>
+              </a:ext>
+            </a:extLst>
+          </p:cNvPr>
+          <p:cNvSpPr/>
+          <p:nvPr/>
+        </p:nvSpPr>
+        <p:spPr>
+          <a:xfrm>
+            <a:off x="6815575" y="4494229"/>
+            <a:ext cx="2139885" cy="652147"/>
+          </a:xfrm>
+          <a:prstGeom prst="roundRect">
+            <a:avLst/>
+          </a:prstGeom>
+        </p:spPr>
+        <p:style>
+          <a:lnRef idx="2">
+            <a:schemeClr val="accent2">
+              <a:shade val="50000"/>
+            </a:schemeClr>
+          </a:lnRef>
+          <a:fillRef idx="1">
+            <a:schemeClr val="accent2"/>
+          </a:fillRef>
+          <a:effectRef idx="0">
+            <a:schemeClr val="accent2"/>
+          </a:effectRef>
+          <a:fontRef idx="minor">
+            <a:schemeClr val="lt1"/>
+          </a:fontRef>
+        </p:style>
+        <p:txBody>
+          <a:bodyPr rtlCol="0" anchor="ctr"/>
+          <a:lstStyle/>
+          <a:p>
+            <a:pPr algn="ctr"/>
+            <a:r>
+              <a:rPr lang="en-US" dirty="0"/>
+              <a:t>Estimate number of states traversed</a:t>
+            </a:r>
+          </a:p>
+        </p:txBody>
+      </p:sp>
+      <p:sp>
+        <p:nvSpPr>
+          <p:cNvPr id="15" name="Rectangle 14">
+            <a:extLst>
+              <a:ext uri="{FF2B5EF4-FFF2-40B4-BE49-F238E27FC236}">
+                <a16:creationId xmlns:a16="http://schemas.microsoft.com/office/drawing/2014/main" id="{3A827B16-0D0F-4B50-A4AE-2FC3FA0461EE}"/>
+              </a:ext>
+            </a:extLst>
+          </p:cNvPr>
+          <p:cNvSpPr/>
+          <p:nvPr/>
+        </p:nvSpPr>
+        <p:spPr>
+          <a:xfrm>
+            <a:off x="1373857" y="3263951"/>
+            <a:ext cx="1715678" cy="801277"/>
+          </a:xfrm>
+          <a:prstGeom prst="rect">
+            <a:avLst/>
+          </a:prstGeom>
+        </p:spPr>
+        <p:style>
+          <a:lnRef idx="2">
+            <a:schemeClr val="accent6"/>
+          </a:lnRef>
+          <a:fillRef idx="1">
+            <a:schemeClr val="lt1"/>
+          </a:fillRef>
+          <a:effectRef idx="0">
+            <a:schemeClr val="accent6"/>
+          </a:effectRef>
+          <a:fontRef idx="minor">
+            <a:schemeClr val="dk1"/>
+          </a:fontRef>
+        </p:style>
+        <p:txBody>
+          <a:bodyPr rtlCol="0" anchor="ctr"/>
+          <a:lstStyle/>
+          <a:p>
+            <a:pPr algn="ctr"/>
+            <a:r>
+              <a:rPr lang="en-US" dirty="0">
+                <a:solidFill>
+                  <a:schemeClr val="dk1"/>
+                </a:solidFill>
+              </a:rPr>
+              <a:t>Objective </a:t>
+            </a:r>
+            <a:r>
+              <a:rPr lang="en-US">
+                <a:solidFill>
+                  <a:schemeClr val="dk1"/>
+                </a:solidFill>
+              </a:rPr>
+              <a:t>function value</a:t>
+            </a:r>
+            <a:endParaRPr lang="en-US" dirty="0">
+              <a:solidFill>
+                <a:schemeClr val="dk1"/>
+              </a:solidFill>
+            </a:endParaRPr>
+          </a:p>
+        </p:txBody>
+      </p:sp>
+      <p:sp>
+        <p:nvSpPr>
+          <p:cNvPr id="22" name="Rectangle 21">
+            <a:extLst>
+              <a:ext uri="{FF2B5EF4-FFF2-40B4-BE49-F238E27FC236}">
+                <a16:creationId xmlns:a16="http://schemas.microsoft.com/office/drawing/2014/main" id="{03F52519-9059-41B1-B1AA-CB06902755E2}"/>
+              </a:ext>
+            </a:extLst>
+          </p:cNvPr>
+          <p:cNvSpPr/>
+          <p:nvPr/>
+        </p:nvSpPr>
+        <p:spPr>
+          <a:xfrm>
+            <a:off x="3467684" y="5931772"/>
+            <a:ext cx="8041063" cy="433633"/>
+          </a:xfrm>
+          <a:prstGeom prst="rect">
+            <a:avLst/>
+          </a:prstGeom>
+          <a:solidFill>
+            <a:schemeClr val="bg1"/>
+          </a:solidFill>
+          <a:ln>
+            <a:solidFill>
+              <a:schemeClr val="tx1"/>
+            </a:solidFill>
+          </a:ln>
+        </p:spPr>
+        <p:style>
+          <a:lnRef idx="2">
+            <a:schemeClr val="accent1">
+              <a:shade val="50000"/>
+            </a:schemeClr>
+          </a:lnRef>
+          <a:fillRef idx="1">
+            <a:schemeClr val="accent1"/>
+          </a:fillRef>
+          <a:effectRef idx="0">
+            <a:schemeClr val="accent1"/>
+          </a:effectRef>
+          <a:fontRef idx="minor">
+            <a:schemeClr val="lt1"/>
+          </a:fontRef>
+        </p:style>
+        <p:txBody>
+          <a:bodyPr rtlCol="0" anchor="ctr"/>
+          <a:lstStyle/>
+          <a:p>
+            <a:pPr algn="ctr"/>
+            <a:r>
+              <a:rPr lang="en-US" sz="1200" dirty="0">
+                <a:solidFill>
+                  <a:schemeClr val="tx1"/>
+                </a:solidFill>
+              </a:rPr>
+              <a:t>Gandini et al., </a:t>
+            </a:r>
+            <a:r>
+              <a:rPr lang="en-US" sz="1200" i="1" dirty="0">
+                <a:solidFill>
+                  <a:schemeClr val="tx1"/>
+                </a:solidFill>
+              </a:rPr>
+              <a:t>A framework for automated detection of power-related software errors in industrial verification processes</a:t>
+            </a:r>
+            <a:r>
+              <a:rPr lang="en-US" sz="1200" dirty="0">
+                <a:solidFill>
+                  <a:schemeClr val="tx1"/>
+                </a:solidFill>
+              </a:rPr>
+              <a:t>, 2010</a:t>
+            </a:r>
           </a:p>
         </p:txBody>
       </p:sp>
@@ -3285,8 +4121,8 @@
           </a:p>
         </p:txBody>
       </p:sp>
-      <mc:AlternateContent xmlns:mc="http://schemas.openxmlformats.org/markup-compatibility/2006" xmlns:a14="http://schemas.microsoft.com/office/drawing/2010/main">
-        <mc:Choice Requires="a14">
+      <mc:AlternateContent xmlns:mc="http://schemas.openxmlformats.org/markup-compatibility/2006">
+        <mc:Choice xmlns:a14="http://schemas.microsoft.com/office/drawing/2010/main" Requires="a14">
           <p:sp>
             <p:nvSpPr>
               <p:cNvPr id="4" name="ZoneTexte 3">
@@ -3357,10 +4193,10 @@
                             </m:e>
                             <m:sub>
                               <m:r>
-                                <a:rPr lang="en-US" sz="3600" i="0">
+                                <a:rPr lang="it-IT" sz="3600" b="0" i="0" smtClean="0">
                                   <a:latin typeface="Cambria Math" panose="02040503050406030204" pitchFamily="18" charset="0"/>
                                 </a:rPr>
-                                <m:t>0</m:t>
+                                <m:t>1</m:t>
                               </m:r>
                             </m:sub>
                           </m:sSub>
@@ -3391,10 +4227,16 @@
                             </m:e>
                             <m:sub>
                               <m:r>
+                                <a:rPr lang="it-IT" sz="3600" b="0" i="0" smtClean="0">
+                                  <a:latin typeface="Cambria Math" panose="02040503050406030204" pitchFamily="18" charset="0"/>
+                                </a:rPr>
+                                <m:t>2</m:t>
+                              </m:r>
+                              <m:r>
                                 <a:rPr lang="en-US" sz="3600" i="0">
                                   <a:latin typeface="Cambria Math" panose="02040503050406030204" pitchFamily="18" charset="0"/>
                                 </a:rPr>
-                                <m:t>1,…</m:t>
+                                <m:t>,…</m:t>
                               </m:r>
                             </m:sub>
                           </m:sSub>
@@ -3442,7 +4284,7 @@
             </p:txBody>
           </p:sp>
         </mc:Choice>
-        <mc:Fallback xmlns="">
+        <mc:Fallback>
           <p:sp>
             <p:nvSpPr>
               <p:cNvPr id="4" name="ZoneTexte 3">
@@ -4020,8 +4862,8 @@
           </a:p>
         </p:txBody>
       </p:sp>
-      <mc:AlternateContent xmlns:mc="http://schemas.openxmlformats.org/markup-compatibility/2006" xmlns:a14="http://schemas.microsoft.com/office/drawing/2010/main">
-        <mc:Choice Requires="a14">
+      <mc:AlternateContent xmlns:mc="http://schemas.openxmlformats.org/markup-compatibility/2006">
+        <mc:Choice xmlns:a14="http://schemas.microsoft.com/office/drawing/2010/main" Requires="a14">
           <p:sp>
             <p:nvSpPr>
               <p:cNvPr id="4" name="ZoneTexte 3">
@@ -4092,10 +4934,10 @@
                             </m:e>
                             <m:sub>
                               <m:r>
-                                <a:rPr lang="en-US" sz="3600" i="0">
+                                <a:rPr lang="it-IT" sz="3600" b="0" i="0" smtClean="0">
                                   <a:latin typeface="Cambria Math" panose="02040503050406030204" pitchFamily="18" charset="0"/>
                                 </a:rPr>
-                                <m:t>0</m:t>
+                                <m:t>1</m:t>
                               </m:r>
                             </m:sub>
                           </m:sSub>
@@ -4126,10 +4968,16 @@
                             </m:e>
                             <m:sub>
                               <m:r>
+                                <a:rPr lang="it-IT" sz="3600" b="0" i="0" smtClean="0">
+                                  <a:latin typeface="Cambria Math" panose="02040503050406030204" pitchFamily="18" charset="0"/>
+                                </a:rPr>
+                                <m:t>2</m:t>
+                              </m:r>
+                              <m:r>
                                 <a:rPr lang="en-US" sz="3600" i="0">
                                   <a:latin typeface="Cambria Math" panose="02040503050406030204" pitchFamily="18" charset="0"/>
                                 </a:rPr>
-                                <m:t>1,…</m:t>
+                                <m:t>,…</m:t>
                               </m:r>
                             </m:sub>
                           </m:sSub>
@@ -4177,7 +5025,7 @@
             </p:txBody>
           </p:sp>
         </mc:Choice>
-        <mc:Fallback xmlns="">
+        <mc:Fallback>
           <p:sp>
             <p:nvSpPr>
               <p:cNvPr id="4" name="ZoneTexte 3">
@@ -5535,6 +6383,526 @@
       </p:grpSpPr>
       <p:sp>
         <p:nvSpPr>
+          <p:cNvPr id="2" name="Titre 1">
+            <a:extLst>
+              <a:ext uri="{FF2B5EF4-FFF2-40B4-BE49-F238E27FC236}">
+                <a16:creationId xmlns:a16="http://schemas.microsoft.com/office/drawing/2014/main" id="{3E171BF4-A4FE-4031-8318-615937AD148D}"/>
+              </a:ext>
+            </a:extLst>
+          </p:cNvPr>
+          <p:cNvSpPr>
+            <a:spLocks noGrp="1"/>
+          </p:cNvSpPr>
+          <p:nvPr>
+            <p:ph type="title"/>
+          </p:nvPr>
+        </p:nvSpPr>
+        <p:spPr/>
+        <p:txBody>
+          <a:bodyPr/>
+          <a:lstStyle/>
+          <a:p>
+            <a:r>
+              <a:rPr lang="en-US" dirty="0"/>
+              <a:t>Optimizing under incertitude</a:t>
+            </a:r>
+          </a:p>
+        </p:txBody>
+      </p:sp>
+      <p:sp>
+        <p:nvSpPr>
+          <p:cNvPr id="3" name="Espace réservé du texte 2">
+            <a:extLst>
+              <a:ext uri="{FF2B5EF4-FFF2-40B4-BE49-F238E27FC236}">
+                <a16:creationId xmlns:a16="http://schemas.microsoft.com/office/drawing/2014/main" id="{249C8535-422F-4BCC-8AB3-54A906D18307}"/>
+              </a:ext>
+            </a:extLst>
+          </p:cNvPr>
+          <p:cNvSpPr>
+            <a:spLocks noGrp="1"/>
+          </p:cNvSpPr>
+          <p:nvPr>
+            <p:ph type="body" sz="quarter" idx="10"/>
+          </p:nvPr>
+        </p:nvSpPr>
+        <p:spPr/>
+        <p:txBody>
+          <a:bodyPr/>
+          <a:lstStyle/>
+          <a:p>
+            <a:r>
+              <a:rPr lang="en-US" dirty="0"/>
+              <a:t>Objective function is </a:t>
+            </a:r>
+            <a:r>
+              <a:rPr lang="en-US" i="1" dirty="0"/>
+              <a:t>noisy</a:t>
+            </a:r>
+            <a:r>
+              <a:rPr lang="en-US" dirty="0"/>
+              <a:t> or </a:t>
+            </a:r>
+            <a:r>
+              <a:rPr lang="en-US" i="1" dirty="0"/>
+              <a:t>stochastic</a:t>
+            </a:r>
+          </a:p>
+          <a:p>
+            <a:pPr lvl="1"/>
+            <a:r>
+              <a:rPr lang="en-US" dirty="0"/>
+              <a:t>Evaluate each candidate solution several times</a:t>
+            </a:r>
+          </a:p>
+          <a:p>
+            <a:pPr lvl="1"/>
+            <a:r>
+              <a:rPr lang="en-US" dirty="0"/>
+              <a:t>Obtain a </a:t>
+            </a:r>
+            <a:r>
+              <a:rPr lang="en-US" b="1" dirty="0"/>
+              <a:t>mean</a:t>
+            </a:r>
+            <a:r>
+              <a:rPr lang="en-US" dirty="0"/>
+              <a:t> and a </a:t>
+            </a:r>
+            <a:r>
+              <a:rPr lang="en-US" b="1" dirty="0"/>
+              <a:t>standard deviation</a:t>
+            </a:r>
+          </a:p>
+          <a:p>
+            <a:pPr lvl="1"/>
+            <a:endParaRPr lang="en-US" b="1" dirty="0"/>
+          </a:p>
+          <a:p>
+            <a:r>
+              <a:rPr lang="en-US" dirty="0"/>
+              <a:t>Compare candidate solutions using </a:t>
+            </a:r>
+            <a:r>
+              <a:rPr lang="en-US" b="1" dirty="0"/>
+              <a:t>statistical tests</a:t>
+            </a:r>
+          </a:p>
+          <a:p>
+            <a:r>
+              <a:rPr lang="en-US" b="1" dirty="0"/>
+              <a:t>Multi-objective</a:t>
+            </a:r>
+            <a:r>
+              <a:rPr lang="en-US" dirty="0"/>
+              <a:t>: add minimization of standard deviation</a:t>
+            </a:r>
+          </a:p>
+        </p:txBody>
+      </p:sp>
+    </p:spTree>
+    <p:extLst>
+      <p:ext uri="{BB962C8B-B14F-4D97-AF65-F5344CB8AC3E}">
+        <p14:creationId xmlns:p14="http://schemas.microsoft.com/office/powerpoint/2010/main" val="1720991385"/>
+      </p:ext>
+    </p:extLst>
+  </p:cSld>
+  <p:clrMapOvr>
+    <a:masterClrMapping/>
+  </p:clrMapOvr>
+</p:sld>
+</file>
+
+<file path=ppt/slides/slide2.xml><?xml version="1.0" encoding="utf-8"?>
+<p:sld xmlns:a="http://schemas.openxmlformats.org/drawingml/2006/main" xmlns:r="http://schemas.openxmlformats.org/officeDocument/2006/relationships" xmlns:p="http://schemas.openxmlformats.org/presentationml/2006/main">
+  <p:cSld>
+    <p:spTree>
+      <p:nvGrpSpPr>
+        <p:cNvPr id="1" name=""/>
+        <p:cNvGrpSpPr/>
+        <p:nvPr/>
+      </p:nvGrpSpPr>
+      <p:grpSpPr>
+        <a:xfrm>
+          <a:off x="0" y="0"/>
+          <a:ext cx="0" cy="0"/>
+          <a:chOff x="0" y="0"/>
+          <a:chExt cx="0" cy="0"/>
+        </a:xfrm>
+      </p:grpSpPr>
+      <p:sp>
+        <p:nvSpPr>
+          <p:cNvPr id="4" name="Titre 3"/>
+          <p:cNvSpPr>
+            <a:spLocks noGrp="1"/>
+          </p:cNvSpPr>
+          <p:nvPr>
+            <p:ph type="title"/>
+          </p:nvPr>
+        </p:nvSpPr>
+        <p:spPr/>
+        <p:txBody>
+          <a:bodyPr/>
+          <a:lstStyle/>
+          <a:p>
+            <a:r>
+              <a:rPr lang="en-US" dirty="0"/>
+              <a:t>Outline</a:t>
+            </a:r>
+          </a:p>
+        </p:txBody>
+      </p:sp>
+      <p:sp>
+        <p:nvSpPr>
+          <p:cNvPr id="5" name="Espace réservé du texte 4"/>
+          <p:cNvSpPr>
+            <a:spLocks noGrp="1"/>
+          </p:cNvSpPr>
+          <p:nvPr>
+            <p:ph type="body" sz="quarter" idx="10"/>
+          </p:nvPr>
+        </p:nvSpPr>
+        <p:spPr/>
+        <p:txBody>
+          <a:bodyPr/>
+          <a:lstStyle/>
+          <a:p>
+            <a:r>
+              <a:rPr lang="en-US" dirty="0"/>
+              <a:t>Finding multiple optima</a:t>
+            </a:r>
+          </a:p>
+          <a:p>
+            <a:r>
+              <a:rPr lang="en-US" dirty="0"/>
+              <a:t>Deceptive objective functions</a:t>
+            </a:r>
+          </a:p>
+          <a:p>
+            <a:r>
+              <a:rPr lang="en-US" dirty="0"/>
+              <a:t>Flat objective functions</a:t>
+            </a:r>
+          </a:p>
+          <a:p>
+            <a:r>
+              <a:rPr lang="en-US" dirty="0"/>
+              <a:t>Expensive objective functions</a:t>
+            </a:r>
+          </a:p>
+          <a:p>
+            <a:r>
+              <a:rPr lang="en-US" dirty="0"/>
+              <a:t>Optimizing under incertitude</a:t>
+            </a:r>
+          </a:p>
+          <a:p>
+            <a:r>
+              <a:rPr lang="en-US" dirty="0"/>
+              <a:t>Dynamic objective functions</a:t>
+            </a:r>
+          </a:p>
+        </p:txBody>
+      </p:sp>
+      <p:pic>
+        <p:nvPicPr>
+          <p:cNvPr id="3" name="Image 2">
+            <a:extLst>
+              <a:ext uri="{FF2B5EF4-FFF2-40B4-BE49-F238E27FC236}">
+                <a16:creationId xmlns:a16="http://schemas.microsoft.com/office/drawing/2014/main" id="{750A2D94-B5A2-4CCF-A9EA-57D77F281AC0}"/>
+              </a:ext>
+            </a:extLst>
+          </p:cNvPr>
+          <p:cNvPicPr>
+            <a:picLocks noChangeAspect="1"/>
+          </p:cNvPicPr>
+          <p:nvPr/>
+        </p:nvPicPr>
+        <p:blipFill rotWithShape="1">
+          <a:blip r:embed="rId2"/>
+          <a:srcRect l="53394"/>
+          <a:stretch/>
+        </p:blipFill>
+        <p:spPr>
+          <a:xfrm>
+            <a:off x="7909089" y="1180706"/>
+            <a:ext cx="2365036" cy="4945795"/>
+          </a:xfrm>
+          <a:prstGeom prst="rect">
+            <a:avLst/>
+          </a:prstGeom>
+          <a:ln>
+            <a:noFill/>
+          </a:ln>
+          <a:effectLst>
+            <a:softEdge rad="112500"/>
+          </a:effectLst>
+        </p:spPr>
+      </p:pic>
+    </p:spTree>
+    <p:extLst>
+      <p:ext uri="{BB962C8B-B14F-4D97-AF65-F5344CB8AC3E}">
+        <p14:creationId xmlns:p14="http://schemas.microsoft.com/office/powerpoint/2010/main" val="454349701"/>
+      </p:ext>
+    </p:extLst>
+  </p:cSld>
+  <p:clrMapOvr>
+    <a:masterClrMapping/>
+  </p:clrMapOvr>
+</p:sld>
+</file>
+
+<file path=ppt/slides/slide20.xml><?xml version="1.0" encoding="utf-8"?>
+<p:sld xmlns:a="http://schemas.openxmlformats.org/drawingml/2006/main" xmlns:r="http://schemas.openxmlformats.org/officeDocument/2006/relationships" xmlns:p="http://schemas.openxmlformats.org/presentationml/2006/main">
+  <p:cSld>
+    <p:spTree>
+      <p:nvGrpSpPr>
+        <p:cNvPr id="1" name=""/>
+        <p:cNvGrpSpPr/>
+        <p:nvPr/>
+      </p:nvGrpSpPr>
+      <p:grpSpPr>
+        <a:xfrm>
+          <a:off x="0" y="0"/>
+          <a:ext cx="0" cy="0"/>
+          <a:chOff x="0" y="0"/>
+          <a:chExt cx="0" cy="0"/>
+        </a:xfrm>
+      </p:grpSpPr>
+      <p:sp>
+        <p:nvSpPr>
+          <p:cNvPr id="2" name="Titre 1">
+            <a:extLst>
+              <a:ext uri="{FF2B5EF4-FFF2-40B4-BE49-F238E27FC236}">
+                <a16:creationId xmlns:a16="http://schemas.microsoft.com/office/drawing/2014/main" id="{E61DEA70-492D-411C-98F3-126F41E4069D}"/>
+              </a:ext>
+            </a:extLst>
+          </p:cNvPr>
+          <p:cNvSpPr>
+            <a:spLocks noGrp="1"/>
+          </p:cNvSpPr>
+          <p:nvPr>
+            <p:ph type="title"/>
+          </p:nvPr>
+        </p:nvSpPr>
+        <p:spPr/>
+        <p:txBody>
+          <a:bodyPr/>
+          <a:lstStyle/>
+          <a:p>
+            <a:r>
+              <a:rPr lang="en-US" dirty="0"/>
+              <a:t>Dynamic objective functions</a:t>
+            </a:r>
+          </a:p>
+        </p:txBody>
+      </p:sp>
+      <mc:AlternateContent xmlns:mc="http://schemas.openxmlformats.org/markup-compatibility/2006">
+        <mc:Choice xmlns:a14="http://schemas.microsoft.com/office/drawing/2010/main" Requires="a14">
+          <p:sp>
+            <p:nvSpPr>
+              <p:cNvPr id="3" name="Espace réservé du texte 2">
+                <a:extLst>
+                  <a:ext uri="{FF2B5EF4-FFF2-40B4-BE49-F238E27FC236}">
+                    <a16:creationId xmlns:a16="http://schemas.microsoft.com/office/drawing/2014/main" id="{D5FD7ACA-197F-439D-93F1-7310CBBB8AED}"/>
+                  </a:ext>
+                </a:extLst>
+              </p:cNvPr>
+              <p:cNvSpPr>
+                <a:spLocks noGrp="1"/>
+              </p:cNvSpPr>
+              <p:nvPr>
+                <p:ph type="body" sz="quarter" idx="10"/>
+              </p:nvPr>
+            </p:nvSpPr>
+            <p:spPr/>
+            <p:txBody>
+              <a:bodyPr/>
+              <a:lstStyle/>
+              <a:p>
+                <a:r>
+                  <a:rPr lang="en-US" dirty="0"/>
+                  <a:t>Objective function: </a:t>
+                </a:r>
+                <a14:m>
+                  <m:oMath xmlns:m="http://schemas.openxmlformats.org/officeDocument/2006/math">
+                    <m:r>
+                      <m:rPr>
+                        <m:sty m:val="p"/>
+                      </m:rPr>
+                      <a:rPr lang="it-IT" b="0" i="0" smtClean="0">
+                        <a:latin typeface="Cambria Math" panose="02040503050406030204" pitchFamily="18" charset="0"/>
+                      </a:rPr>
+                      <m:t>y</m:t>
+                    </m:r>
+                    <m:r>
+                      <a:rPr lang="it-IT" b="0" i="0" smtClean="0">
+                        <a:latin typeface="Cambria Math" panose="02040503050406030204" pitchFamily="18" charset="0"/>
+                      </a:rPr>
+                      <m:t>=</m:t>
+                    </m:r>
+                    <m:r>
+                      <a:rPr lang="it-IT" b="0" i="1" smtClean="0">
+                        <a:latin typeface="Cambria Math" panose="02040503050406030204" pitchFamily="18" charset="0"/>
+                      </a:rPr>
+                      <m:t>𝑓</m:t>
+                    </m:r>
+                    <m:r>
+                      <a:rPr lang="it-IT" b="0" i="1" smtClean="0">
+                        <a:latin typeface="Cambria Math" panose="02040503050406030204" pitchFamily="18" charset="0"/>
+                      </a:rPr>
+                      <m:t>(</m:t>
+                    </m:r>
+                    <m:r>
+                      <a:rPr lang="it-IT" b="1" i="1" smtClean="0">
+                        <a:latin typeface="Cambria Math" panose="02040503050406030204" pitchFamily="18" charset="0"/>
+                      </a:rPr>
+                      <m:t>𝒙</m:t>
+                    </m:r>
+                    <m:r>
+                      <a:rPr lang="it-IT" b="0" i="1" smtClean="0">
+                        <a:latin typeface="Cambria Math" panose="02040503050406030204" pitchFamily="18" charset="0"/>
+                      </a:rPr>
+                      <m:t>,</m:t>
+                    </m:r>
+                    <m:r>
+                      <a:rPr lang="it-IT" b="0" i="1" smtClean="0">
+                        <a:solidFill>
+                          <a:srgbClr val="FF0000"/>
+                        </a:solidFill>
+                        <a:latin typeface="Cambria Math" panose="02040503050406030204" pitchFamily="18" charset="0"/>
+                      </a:rPr>
+                      <m:t>𝑡</m:t>
+                    </m:r>
+                    <m:r>
+                      <a:rPr lang="it-IT" b="0" i="1" smtClean="0">
+                        <a:latin typeface="Cambria Math" panose="02040503050406030204" pitchFamily="18" charset="0"/>
+                      </a:rPr>
+                      <m:t>)</m:t>
+                    </m:r>
+                  </m:oMath>
+                </a14:m>
+                <a:endParaRPr lang="en-US" dirty="0"/>
+              </a:p>
+              <a:p>
+                <a:r>
+                  <a:rPr lang="en-US" dirty="0"/>
+                  <a:t>Assumption: the function does not change </a:t>
+                </a:r>
+                <a:r>
+                  <a:rPr lang="en-US" i="1" dirty="0"/>
+                  <a:t>too </a:t>
+                </a:r>
+                <a:r>
+                  <a:rPr lang="en-US" dirty="0"/>
+                  <a:t>abruptly</a:t>
+                </a:r>
+              </a:p>
+              <a:p>
+                <a:pPr lvl="1"/>
+                <a:r>
+                  <a:rPr lang="en-US" dirty="0"/>
+                  <a:t>Re-evaluate current best solution(s)</a:t>
+                </a:r>
+              </a:p>
+              <a:p>
+                <a:pPr lvl="1"/>
+                <a:r>
+                  <a:rPr lang="en-US" dirty="0"/>
+                  <a:t>If a change is detected, re-run optimization</a:t>
+                </a:r>
+              </a:p>
+              <a:p>
+                <a:pPr lvl="1"/>
+                <a:r>
+                  <a:rPr lang="en-US" dirty="0"/>
+                  <a:t>Start search from an area around current best point</a:t>
+                </a:r>
+              </a:p>
+              <a:p>
+                <a:pPr lvl="1"/>
+                <a:r>
+                  <a:rPr lang="en-US" dirty="0"/>
+                  <a:t>Store past solutions, eventually re-inject them (periodic?)</a:t>
+                </a:r>
+              </a:p>
+              <a:p>
+                <a:endParaRPr lang="en-US" dirty="0"/>
+              </a:p>
+            </p:txBody>
+          </p:sp>
+        </mc:Choice>
+        <mc:Fallback>
+          <p:sp>
+            <p:nvSpPr>
+              <p:cNvPr id="3" name="Espace réservé du texte 2">
+                <a:extLst>
+                  <a:ext uri="{FF2B5EF4-FFF2-40B4-BE49-F238E27FC236}">
+                    <a16:creationId xmlns:a16="http://schemas.microsoft.com/office/drawing/2014/main" id="{D5FD7ACA-197F-439D-93F1-7310CBBB8AED}"/>
+                  </a:ext>
+                </a:extLst>
+              </p:cNvPr>
+              <p:cNvSpPr>
+                <a:spLocks noGrp="1" noRot="1" noChangeAspect="1" noMove="1" noResize="1" noEditPoints="1" noAdjustHandles="1" noChangeArrowheads="1" noChangeShapeType="1" noTextEdit="1"/>
+              </p:cNvSpPr>
+              <p:nvPr>
+                <p:ph type="body" sz="quarter" idx="10"/>
+              </p:nvPr>
+            </p:nvSpPr>
+            <p:spPr>
+              <a:blipFill>
+                <a:blip r:embed="rId2"/>
+                <a:stretch>
+                  <a:fillRect l="-1333" t="-2604"/>
+                </a:stretch>
+              </a:blipFill>
+            </p:spPr>
+            <p:txBody>
+              <a:bodyPr/>
+              <a:lstStyle/>
+              <a:p>
+                <a:r>
+                  <a:rPr lang="en-US">
+                    <a:noFill/>
+                  </a:rPr>
+                  <a:t> </a:t>
+                </a:r>
+              </a:p>
+            </p:txBody>
+          </p:sp>
+        </mc:Fallback>
+      </mc:AlternateContent>
+    </p:spTree>
+    <p:extLst>
+      <p:ext uri="{BB962C8B-B14F-4D97-AF65-F5344CB8AC3E}">
+        <p14:creationId xmlns:p14="http://schemas.microsoft.com/office/powerpoint/2010/main" val="579118744"/>
+      </p:ext>
+    </p:extLst>
+  </p:cSld>
+  <p:clrMapOvr>
+    <a:masterClrMapping/>
+  </p:clrMapOvr>
+</p:sld>
+</file>
+
+<file path=ppt/slides/slide21.xml><?xml version="1.0" encoding="utf-8"?>
+<p:sld xmlns:a="http://schemas.openxmlformats.org/drawingml/2006/main" xmlns:r="http://schemas.openxmlformats.org/officeDocument/2006/relationships" xmlns:p="http://schemas.openxmlformats.org/presentationml/2006/main">
+  <p:cSld>
+    <p:spTree>
+      <p:nvGrpSpPr>
+        <p:cNvPr id="1" name=""/>
+        <p:cNvGrpSpPr/>
+        <p:nvPr/>
+      </p:nvGrpSpPr>
+      <p:grpSpPr>
+        <a:xfrm>
+          <a:off x="0" y="0"/>
+          <a:ext cx="0" cy="0"/>
+          <a:chOff x="0" y="0"/>
+          <a:chExt cx="0" cy="0"/>
+        </a:xfrm>
+      </p:grpSpPr>
+      <p:sp>
+        <p:nvSpPr>
           <p:cNvPr id="4" name="Titre 3">
             <a:extLst>
               <a:ext uri="{FF2B5EF4-FFF2-40B4-BE49-F238E27FC236}">
@@ -5592,62 +6960,93 @@
               <a:rPr lang="en-US" dirty="0"/>
             </a:br>
             <a:r>
-              <a:rPr lang="en-US" dirty="0"/>
+              <a:rPr lang="en-US" sz="1600" dirty="0"/>
               <a:t>- Lehman &amp; Stanley, </a:t>
             </a:r>
             <a:r>
-              <a:rPr lang="en-US" i="1" dirty="0"/>
+              <a:rPr lang="en-US" sz="1600" i="1" dirty="0"/>
               <a:t>Abandoning Objectives: Evolution through the Search for Novelty Alone</a:t>
             </a:r>
             <a:r>
-              <a:rPr lang="en-US" dirty="0"/>
+              <a:rPr lang="en-US" sz="1600" dirty="0"/>
               <a:t>, 2011</a:t>
             </a:r>
             <a:br>
-              <a:rPr lang="en-US" dirty="0"/>
+              <a:rPr lang="en-US" sz="1600" dirty="0"/>
             </a:br>
             <a:r>
-              <a:rPr lang="en-US" dirty="0"/>
+              <a:rPr lang="en-US" sz="1600" dirty="0"/>
               <a:t>- </a:t>
             </a:r>
             <a:r>
-              <a:rPr lang="en-US" dirty="0" err="1"/>
+              <a:rPr lang="en-US" sz="1600" dirty="0" err="1"/>
               <a:t>Alshawhan</a:t>
             </a:r>
             <a:r>
-              <a:rPr lang="en-US" dirty="0"/>
+              <a:rPr lang="en-US" sz="1600" dirty="0"/>
               <a:t> et al., </a:t>
             </a:r>
             <a:r>
-              <a:rPr lang="en-US" i="1" dirty="0"/>
+              <a:rPr lang="en-US" sz="1600" i="1" dirty="0"/>
               <a:t>Deploying Search Based Software Engineering with </a:t>
             </a:r>
             <a:r>
-              <a:rPr lang="en-US" i="1" dirty="0" err="1"/>
+              <a:rPr lang="en-US" sz="1600" i="1" dirty="0" err="1"/>
               <a:t>Sapienz</a:t>
             </a:r>
             <a:r>
-              <a:rPr lang="en-US" i="1" dirty="0"/>
+              <a:rPr lang="en-US" sz="1600" i="1" dirty="0"/>
               <a:t> at Facebook</a:t>
             </a:r>
             <a:r>
-              <a:rPr lang="en-US" dirty="0"/>
+              <a:rPr lang="en-US" sz="1600" dirty="0"/>
               <a:t>, 2018</a:t>
             </a:r>
             <a:br>
-              <a:rPr lang="en-US" dirty="0"/>
+              <a:rPr lang="en-US" sz="1600" dirty="0"/>
             </a:br>
             <a:r>
-              <a:rPr lang="en-US" dirty="0"/>
+              <a:rPr lang="en-US" sz="1600" dirty="0"/>
               <a:t>- Frazier, </a:t>
             </a:r>
             <a:r>
-              <a:rPr lang="en-US" i="1" dirty="0"/>
+              <a:rPr lang="en-US" sz="1600" i="1" dirty="0"/>
               <a:t>A Tutorial on Bayesian Optimization</a:t>
             </a:r>
             <a:r>
-              <a:rPr lang="en-US" dirty="0"/>
+              <a:rPr lang="en-US" sz="1600" dirty="0"/>
               <a:t>, 2018</a:t>
+            </a:r>
+            <a:br>
+              <a:rPr lang="en-US" sz="1600" dirty="0"/>
+            </a:br>
+            <a:r>
+              <a:rPr lang="en-US" sz="1600" dirty="0"/>
+              <a:t>- </a:t>
+            </a:r>
+            <a:r>
+              <a:rPr lang="en-US" sz="1600" dirty="0" err="1"/>
+              <a:t>Branke</a:t>
+            </a:r>
+            <a:r>
+              <a:rPr lang="en-US" sz="1600" dirty="0"/>
+              <a:t> &amp; </a:t>
+            </a:r>
+            <a:r>
+              <a:rPr lang="en-US" sz="1600" dirty="0" err="1"/>
+              <a:t>Schmeck</a:t>
+            </a:r>
+            <a:r>
+              <a:rPr lang="en-US" sz="1600" dirty="0"/>
+              <a:t>, </a:t>
+            </a:r>
+            <a:r>
+              <a:rPr lang="en-US" sz="1600" i="1" dirty="0"/>
+              <a:t>Designing Evolutionary Algorithms for Dynamic Optimization Problems</a:t>
+            </a:r>
+            <a:r>
+              <a:rPr lang="en-US" sz="1600" dirty="0"/>
+              <a:t>, 2003</a:t>
             </a:r>
           </a:p>
           <a:p>
@@ -5746,104 +7145,6 @@
     <p:extLst>
       <p:ext uri="{BB962C8B-B14F-4D97-AF65-F5344CB8AC3E}">
         <p14:creationId xmlns:p14="http://schemas.microsoft.com/office/powerpoint/2010/main" val="938009228"/>
-      </p:ext>
-    </p:extLst>
-  </p:cSld>
-  <p:clrMapOvr>
-    <a:masterClrMapping/>
-  </p:clrMapOvr>
-</p:sld>
-</file>
-
-<file path=ppt/slides/slide2.xml><?xml version="1.0" encoding="utf-8"?>
-<p:sld xmlns:a="http://schemas.openxmlformats.org/drawingml/2006/main" xmlns:r="http://schemas.openxmlformats.org/officeDocument/2006/relationships" xmlns:p="http://schemas.openxmlformats.org/presentationml/2006/main">
-  <p:cSld>
-    <p:spTree>
-      <p:nvGrpSpPr>
-        <p:cNvPr id="1" name=""/>
-        <p:cNvGrpSpPr/>
-        <p:nvPr/>
-      </p:nvGrpSpPr>
-      <p:grpSpPr>
-        <a:xfrm>
-          <a:off x="0" y="0"/>
-          <a:ext cx="0" cy="0"/>
-          <a:chOff x="0" y="0"/>
-          <a:chExt cx="0" cy="0"/>
-        </a:xfrm>
-      </p:grpSpPr>
-      <p:sp>
-        <p:nvSpPr>
-          <p:cNvPr id="4" name="Titre 3"/>
-          <p:cNvSpPr>
-            <a:spLocks noGrp="1"/>
-          </p:cNvSpPr>
-          <p:nvPr>
-            <p:ph type="title"/>
-          </p:nvPr>
-        </p:nvSpPr>
-        <p:spPr/>
-        <p:txBody>
-          <a:bodyPr/>
-          <a:lstStyle/>
-          <a:p>
-            <a:r>
-              <a:rPr lang="en-US" dirty="0"/>
-              <a:t>Outline</a:t>
-            </a:r>
-          </a:p>
-        </p:txBody>
-      </p:sp>
-      <p:sp>
-        <p:nvSpPr>
-          <p:cNvPr id="5" name="Espace réservé du texte 4"/>
-          <p:cNvSpPr>
-            <a:spLocks noGrp="1"/>
-          </p:cNvSpPr>
-          <p:nvPr>
-            <p:ph type="body" sz="quarter" idx="10"/>
-          </p:nvPr>
-        </p:nvSpPr>
-        <p:spPr/>
-        <p:txBody>
-          <a:bodyPr/>
-          <a:lstStyle/>
-          <a:p>
-            <a:r>
-              <a:rPr lang="en-US" dirty="0"/>
-              <a:t>Finding multiple optima</a:t>
-            </a:r>
-          </a:p>
-          <a:p>
-            <a:r>
-              <a:rPr lang="en-US" dirty="0"/>
-              <a:t>Deceptive objective functions</a:t>
-            </a:r>
-          </a:p>
-          <a:p>
-            <a:r>
-              <a:rPr lang="en-US" dirty="0"/>
-              <a:t>Flat objective functions</a:t>
-            </a:r>
-          </a:p>
-          <a:p>
-            <a:r>
-              <a:rPr lang="en-US" dirty="0"/>
-              <a:t>Expensive objective functions</a:t>
-            </a:r>
-          </a:p>
-          <a:p>
-            <a:r>
-              <a:rPr lang="en-US" dirty="0"/>
-              <a:t>Dynamic objective functions</a:t>
-            </a:r>
-          </a:p>
-        </p:txBody>
-      </p:sp>
-    </p:spTree>
-    <p:extLst>
-      <p:ext uri="{BB962C8B-B14F-4D97-AF65-F5344CB8AC3E}">
-        <p14:creationId xmlns:p14="http://schemas.microsoft.com/office/powerpoint/2010/main" val="454349701"/>
       </p:ext>
     </p:extLst>
   </p:cSld>
@@ -6345,6 +7646,357 @@
             <a:r>
               <a:rPr lang="en-US" dirty="0"/>
               <a:t>Isolated solutions are favored</a:t>
+            </a:r>
+          </a:p>
+        </p:txBody>
+      </p:sp>
+      <p:pic>
+        <p:nvPicPr>
+          <p:cNvPr id="4" name="Image 3">
+            <a:extLst>
+              <a:ext uri="{FF2B5EF4-FFF2-40B4-BE49-F238E27FC236}">
+                <a16:creationId xmlns:a16="http://schemas.microsoft.com/office/drawing/2014/main" id="{78272FDD-F5C1-4464-A988-988909A23921}"/>
+              </a:ext>
+            </a:extLst>
+          </p:cNvPr>
+          <p:cNvPicPr>
+            <a:picLocks noChangeAspect="1"/>
+          </p:cNvPicPr>
+          <p:nvPr/>
+        </p:nvPicPr>
+        <p:blipFill>
+          <a:blip r:embed="rId2"/>
+          <a:stretch>
+            <a:fillRect/>
+          </a:stretch>
+        </p:blipFill>
+        <p:spPr>
+          <a:xfrm>
+            <a:off x="7598003" y="3435356"/>
+            <a:ext cx="4025535" cy="3057518"/>
+          </a:xfrm>
+          <a:prstGeom prst="rect">
+            <a:avLst/>
+          </a:prstGeom>
+        </p:spPr>
+      </p:pic>
+      <p:pic>
+        <p:nvPicPr>
+          <p:cNvPr id="5" name="Image 4">
+            <a:extLst>
+              <a:ext uri="{FF2B5EF4-FFF2-40B4-BE49-F238E27FC236}">
+                <a16:creationId xmlns:a16="http://schemas.microsoft.com/office/drawing/2014/main" id="{6BA6F8C0-558F-45D6-BFA5-E1B0FA33810E}"/>
+              </a:ext>
+            </a:extLst>
+          </p:cNvPr>
+          <p:cNvPicPr>
+            <a:picLocks noChangeAspect="1"/>
+          </p:cNvPicPr>
+          <p:nvPr/>
+        </p:nvPicPr>
+        <p:blipFill>
+          <a:blip r:embed="rId3"/>
+          <a:stretch>
+            <a:fillRect/>
+          </a:stretch>
+        </p:blipFill>
+        <p:spPr>
+          <a:xfrm>
+            <a:off x="2790083" y="4390970"/>
+            <a:ext cx="3801534" cy="1587983"/>
+          </a:xfrm>
+          <a:prstGeom prst="rect">
+            <a:avLst/>
+          </a:prstGeom>
+        </p:spPr>
+      </p:pic>
+      <p:sp>
+        <p:nvSpPr>
+          <p:cNvPr id="6" name="Rectangle 5">
+            <a:extLst>
+              <a:ext uri="{FF2B5EF4-FFF2-40B4-BE49-F238E27FC236}">
+                <a16:creationId xmlns:a16="http://schemas.microsoft.com/office/drawing/2014/main" id="{16DD4C4B-0405-48C7-90E0-12D83CCBF4C2}"/>
+              </a:ext>
+            </a:extLst>
+          </p:cNvPr>
+          <p:cNvSpPr/>
+          <p:nvPr/>
+        </p:nvSpPr>
+        <p:spPr>
+          <a:xfrm>
+            <a:off x="9021452" y="3667027"/>
+            <a:ext cx="744717" cy="226243"/>
+          </a:xfrm>
+          <a:prstGeom prst="rect">
+            <a:avLst/>
+          </a:prstGeom>
+          <a:solidFill>
+            <a:schemeClr val="bg1"/>
+          </a:solidFill>
+          <a:ln>
+            <a:solidFill>
+              <a:schemeClr val="bg1"/>
+            </a:solidFill>
+          </a:ln>
+        </p:spPr>
+        <p:style>
+          <a:lnRef idx="2">
+            <a:schemeClr val="accent1">
+              <a:shade val="50000"/>
+            </a:schemeClr>
+          </a:lnRef>
+          <a:fillRef idx="1">
+            <a:schemeClr val="accent1"/>
+          </a:fillRef>
+          <a:effectRef idx="0">
+            <a:schemeClr val="accent1"/>
+          </a:effectRef>
+          <a:fontRef idx="minor">
+            <a:schemeClr val="lt1"/>
+          </a:fontRef>
+        </p:style>
+        <p:txBody>
+          <a:bodyPr rtlCol="0" anchor="ctr"/>
+          <a:lstStyle/>
+          <a:p>
+            <a:pPr algn="ctr"/>
+            <a:endParaRPr lang="en-US"/>
+          </a:p>
+        </p:txBody>
+      </p:sp>
+      <p:sp>
+        <p:nvSpPr>
+          <p:cNvPr id="7" name="Rectangle 6">
+            <a:extLst>
+              <a:ext uri="{FF2B5EF4-FFF2-40B4-BE49-F238E27FC236}">
+                <a16:creationId xmlns:a16="http://schemas.microsoft.com/office/drawing/2014/main" id="{A321593E-E735-47B4-B87E-E22E38FDD986}"/>
+              </a:ext>
+            </a:extLst>
+          </p:cNvPr>
+          <p:cNvSpPr/>
+          <p:nvPr/>
+        </p:nvSpPr>
+        <p:spPr>
+          <a:xfrm>
+            <a:off x="10218656" y="5835192"/>
+            <a:ext cx="1216057" cy="263983"/>
+          </a:xfrm>
+          <a:prstGeom prst="rect">
+            <a:avLst/>
+          </a:prstGeom>
+          <a:solidFill>
+            <a:schemeClr val="bg1"/>
+          </a:solidFill>
+          <a:ln>
+            <a:solidFill>
+              <a:schemeClr val="bg1"/>
+            </a:solidFill>
+          </a:ln>
+        </p:spPr>
+        <p:style>
+          <a:lnRef idx="2">
+            <a:schemeClr val="accent1">
+              <a:shade val="50000"/>
+            </a:schemeClr>
+          </a:lnRef>
+          <a:fillRef idx="1">
+            <a:schemeClr val="accent1"/>
+          </a:fillRef>
+          <a:effectRef idx="0">
+            <a:schemeClr val="accent1"/>
+          </a:effectRef>
+          <a:fontRef idx="minor">
+            <a:schemeClr val="lt1"/>
+          </a:fontRef>
+        </p:style>
+        <p:txBody>
+          <a:bodyPr rtlCol="0" anchor="ctr"/>
+          <a:lstStyle/>
+          <a:p>
+            <a:pPr algn="ctr"/>
+            <a:endParaRPr lang="en-US"/>
+          </a:p>
+        </p:txBody>
+      </p:sp>
+      <p:sp>
+        <p:nvSpPr>
+          <p:cNvPr id="8" name="Rectangle 7">
+            <a:extLst>
+              <a:ext uri="{FF2B5EF4-FFF2-40B4-BE49-F238E27FC236}">
+                <a16:creationId xmlns:a16="http://schemas.microsoft.com/office/drawing/2014/main" id="{337DA55E-7080-413B-957C-8B0BE7F49D20}"/>
+              </a:ext>
+            </a:extLst>
+          </p:cNvPr>
+          <p:cNvSpPr/>
+          <p:nvPr/>
+        </p:nvSpPr>
+        <p:spPr>
+          <a:xfrm>
+            <a:off x="8361680" y="6204768"/>
+            <a:ext cx="1753437" cy="168373"/>
+          </a:xfrm>
+          <a:prstGeom prst="rect">
+            <a:avLst/>
+          </a:prstGeom>
+          <a:solidFill>
+            <a:schemeClr val="bg1"/>
+          </a:solidFill>
+          <a:ln>
+            <a:solidFill>
+              <a:schemeClr val="bg1"/>
+            </a:solidFill>
+          </a:ln>
+        </p:spPr>
+        <p:style>
+          <a:lnRef idx="2">
+            <a:schemeClr val="accent1">
+              <a:shade val="50000"/>
+            </a:schemeClr>
+          </a:lnRef>
+          <a:fillRef idx="1">
+            <a:schemeClr val="accent1"/>
+          </a:fillRef>
+          <a:effectRef idx="0">
+            <a:schemeClr val="accent1"/>
+          </a:effectRef>
+          <a:fontRef idx="minor">
+            <a:schemeClr val="lt1"/>
+          </a:fontRef>
+        </p:style>
+        <p:txBody>
+          <a:bodyPr rtlCol="0" anchor="ctr"/>
+          <a:lstStyle/>
+          <a:p>
+            <a:pPr algn="ctr"/>
+            <a:r>
+              <a:rPr lang="en-US" dirty="0">
+                <a:solidFill>
+                  <a:schemeClr val="tx1"/>
+                </a:solidFill>
+              </a:rPr>
+              <a:t>Optima visited</a:t>
+            </a:r>
+          </a:p>
+        </p:txBody>
+      </p:sp>
+      <p:sp>
+        <p:nvSpPr>
+          <p:cNvPr id="9" name="Rectangle 8">
+            <a:extLst>
+              <a:ext uri="{FF2B5EF4-FFF2-40B4-BE49-F238E27FC236}">
+                <a16:creationId xmlns:a16="http://schemas.microsoft.com/office/drawing/2014/main" id="{CB318B35-4B98-4DDA-95F4-9D8871718B5F}"/>
+              </a:ext>
+            </a:extLst>
+          </p:cNvPr>
+          <p:cNvSpPr/>
+          <p:nvPr/>
+        </p:nvSpPr>
+        <p:spPr>
+          <a:xfrm>
+            <a:off x="5067299" y="5177778"/>
+            <a:ext cx="300991" cy="228612"/>
+          </a:xfrm>
+          <a:prstGeom prst="rect">
+            <a:avLst/>
+          </a:prstGeom>
+          <a:solidFill>
+            <a:schemeClr val="bg1"/>
+          </a:solidFill>
+          <a:ln>
+            <a:solidFill>
+              <a:schemeClr val="bg1"/>
+            </a:solidFill>
+          </a:ln>
+        </p:spPr>
+        <p:style>
+          <a:lnRef idx="2">
+            <a:schemeClr val="accent1">
+              <a:shade val="50000"/>
+            </a:schemeClr>
+          </a:lnRef>
+          <a:fillRef idx="1">
+            <a:schemeClr val="accent1"/>
+          </a:fillRef>
+          <a:effectRef idx="0">
+            <a:schemeClr val="accent1"/>
+          </a:effectRef>
+          <a:fontRef idx="minor">
+            <a:schemeClr val="lt1"/>
+          </a:fontRef>
+        </p:style>
+        <p:txBody>
+          <a:bodyPr rtlCol="0" anchor="ctr"/>
+          <a:lstStyle/>
+          <a:p>
+            <a:pPr algn="ctr"/>
+            <a:r>
+              <a:rPr lang="en-US" sz="1600" dirty="0">
+                <a:solidFill>
+                  <a:schemeClr val="tx1"/>
+                </a:solidFill>
+              </a:rPr>
+              <a:t>if</a:t>
+            </a:r>
+          </a:p>
+        </p:txBody>
+      </p:sp>
+      <p:sp>
+        <p:nvSpPr>
+          <p:cNvPr id="10" name="Rectangle 9">
+            <a:extLst>
+              <a:ext uri="{FF2B5EF4-FFF2-40B4-BE49-F238E27FC236}">
+                <a16:creationId xmlns:a16="http://schemas.microsoft.com/office/drawing/2014/main" id="{85D15B1B-3892-49D2-B154-2828CB5D6A14}"/>
+              </a:ext>
+            </a:extLst>
+          </p:cNvPr>
+          <p:cNvSpPr/>
+          <p:nvPr/>
+        </p:nvSpPr>
+        <p:spPr>
+          <a:xfrm>
+            <a:off x="5067299" y="5464059"/>
+            <a:ext cx="1028701" cy="228612"/>
+          </a:xfrm>
+          <a:prstGeom prst="rect">
+            <a:avLst/>
+          </a:prstGeom>
+          <a:solidFill>
+            <a:schemeClr val="bg1"/>
+          </a:solidFill>
+          <a:ln>
+            <a:solidFill>
+              <a:schemeClr val="bg1"/>
+            </a:solidFill>
+          </a:ln>
+        </p:spPr>
+        <p:style>
+          <a:lnRef idx="2">
+            <a:schemeClr val="accent1">
+              <a:shade val="50000"/>
+            </a:schemeClr>
+          </a:lnRef>
+          <a:fillRef idx="1">
+            <a:schemeClr val="accent1"/>
+          </a:fillRef>
+          <a:effectRef idx="0">
+            <a:schemeClr val="accent1"/>
+          </a:effectRef>
+          <a:fontRef idx="minor">
+            <a:schemeClr val="lt1"/>
+          </a:fontRef>
+        </p:style>
+        <p:txBody>
+          <a:bodyPr rtlCol="0" anchor="ctr"/>
+          <a:lstStyle/>
+          <a:p>
+            <a:pPr algn="ctr"/>
+            <a:r>
+              <a:rPr lang="en-US" sz="1600" dirty="0">
+                <a:solidFill>
+                  <a:schemeClr val="tx1"/>
+                </a:solidFill>
+              </a:rPr>
+              <a:t>otherwise</a:t>
             </a:r>
           </a:p>
         </p:txBody>

</xml_diff>